<commit_message>
changed cheatsheet and powerpoint
</commit_message>
<xml_diff>
--- a/files/GitWorkflow.pptx
+++ b/files/GitWorkflow.pptx
@@ -6,17 +6,13 @@
   </p:sldMasterIdLst>
   <p:sldIdLst>
     <p:sldId id="256" r:id="rId2"/>
-    <p:sldId id="258" r:id="rId3"/>
-    <p:sldId id="262" r:id="rId4"/>
-    <p:sldId id="263" r:id="rId5"/>
-    <p:sldId id="259" r:id="rId6"/>
-    <p:sldId id="264" r:id="rId7"/>
-    <p:sldId id="265" r:id="rId8"/>
-    <p:sldId id="260" r:id="rId9"/>
-    <p:sldId id="266" r:id="rId10"/>
-    <p:sldId id="267" r:id="rId11"/>
-    <p:sldId id="261" r:id="rId12"/>
-    <p:sldId id="268" r:id="rId13"/>
+    <p:sldId id="257" r:id="rId3"/>
+    <p:sldId id="258" r:id="rId4"/>
+    <p:sldId id="259" r:id="rId5"/>
+    <p:sldId id="260" r:id="rId6"/>
+    <p:sldId id="261" r:id="rId7"/>
+    <p:sldId id="262" r:id="rId8"/>
+    <p:sldId id="263" r:id="rId9"/>
   </p:sldIdLst>
   <p:sldSz cx="12192000" cy="6858000"/>
   <p:notesSz cx="6858000" cy="9144000"/>
@@ -118,6 +114,32 @@
 </p:presentation>
 </file>
 
+<file path=ppt/commentAuthors.xml><?xml version="1.0" encoding="utf-8"?>
+<p:cmAuthorLst xmlns:a="http://schemas.openxmlformats.org/drawingml/2006/main" xmlns:r="http://schemas.openxmlformats.org/officeDocument/2006/relationships" xmlns:p="http://schemas.openxmlformats.org/presentationml/2006/main">
+  <p:cmAuthor id="1" name="Microsoft Office User" initials="Office" lastIdx="1" clrIdx="0">
+    <p:extLst>
+      <p:ext uri="{19B8F6BF-5375-455C-9EA6-DF929625EA0E}">
+        <p15:presenceInfo xmlns:p15="http://schemas.microsoft.com/office/powerpoint/2012/main" userId="" providerId=""/>
+      </p:ext>
+    </p:extLst>
+  </p:cmAuthor>
+</p:cmAuthorLst>
+</file>
+
+<file path=ppt/comments/comment1.xml><?xml version="1.0" encoding="utf-8"?>
+<p:cmLst xmlns:a="http://schemas.openxmlformats.org/drawingml/2006/main" xmlns:r="http://schemas.openxmlformats.org/officeDocument/2006/relationships" xmlns:p="http://schemas.openxmlformats.org/presentationml/2006/main">
+  <p:cm authorId="1" dt="2017-06-05T13:35:04.794" idx="1">
+    <p:pos x="10" y="10"/>
+    <p:text/>
+    <p:extLst>
+      <p:ext uri="{C676402C-5697-4E1C-873F-D02D1690AC5C}">
+        <p15:threadingInfo xmlns:p15="http://schemas.microsoft.com/office/powerpoint/2012/main" timeZoneBias="240"/>
+      </p:ext>
+    </p:extLst>
+  </p:cm>
+</p:cmLst>
+</file>
+
 <file path=ppt/slideLayouts/slideLayout1.xml><?xml version="1.0" encoding="utf-8"?>
 <p:sldLayout xmlns:a="http://schemas.openxmlformats.org/drawingml/2006/main" xmlns:r="http://schemas.openxmlformats.org/officeDocument/2006/relationships" xmlns:p="http://schemas.openxmlformats.org/presentationml/2006/main" type="title" preserve="1">
   <p:cSld name="Title Slide">
@@ -247,7 +269,7 @@
           <a:bodyPr/>
           <a:lstStyle/>
           <a:p>
-            <a:fld id="{B4201859-69E5-694B-877D-D67120E65E95}" type="datetimeFigureOut">
+            <a:fld id="{A5CA952A-A168-7946-87B3-921B1C20AEAD}" type="datetimeFigureOut">
               <a:rPr lang="en-US" smtClean="0"/>
               <a:t>6/5/17</a:t>
             </a:fld>
@@ -289,7 +311,7 @@
           <a:bodyPr/>
           <a:lstStyle/>
           <a:p>
-            <a:fld id="{ACC61EC1-E771-5442-A114-2FBE91115F71}" type="slidenum">
+            <a:fld id="{E6F8BD7E-4C52-8B4C-AFA9-5162FA36B05B}" type="slidenum">
               <a:rPr lang="en-US" smtClean="0"/>
               <a:t>‹#›</a:t>
             </a:fld>
@@ -300,7 +322,7 @@
     </p:spTree>
     <p:extLst>
       <p:ext uri="{BB962C8B-B14F-4D97-AF65-F5344CB8AC3E}">
-        <p14:creationId xmlns:p14="http://schemas.microsoft.com/office/powerpoint/2010/main" val="2082061991"/>
+        <p14:creationId xmlns:p14="http://schemas.microsoft.com/office/powerpoint/2010/main" val="157447481"/>
       </p:ext>
     </p:extLst>
   </p:cSld>
@@ -417,7 +439,7 @@
           <a:bodyPr/>
           <a:lstStyle/>
           <a:p>
-            <a:fld id="{B4201859-69E5-694B-877D-D67120E65E95}" type="datetimeFigureOut">
+            <a:fld id="{A5CA952A-A168-7946-87B3-921B1C20AEAD}" type="datetimeFigureOut">
               <a:rPr lang="en-US" smtClean="0"/>
               <a:t>6/5/17</a:t>
             </a:fld>
@@ -459,7 +481,7 @@
           <a:bodyPr/>
           <a:lstStyle/>
           <a:p>
-            <a:fld id="{ACC61EC1-E771-5442-A114-2FBE91115F71}" type="slidenum">
+            <a:fld id="{E6F8BD7E-4C52-8B4C-AFA9-5162FA36B05B}" type="slidenum">
               <a:rPr lang="en-US" smtClean="0"/>
               <a:t>‹#›</a:t>
             </a:fld>
@@ -470,7 +492,7 @@
     </p:spTree>
     <p:extLst>
       <p:ext uri="{BB962C8B-B14F-4D97-AF65-F5344CB8AC3E}">
-        <p14:creationId xmlns:p14="http://schemas.microsoft.com/office/powerpoint/2010/main" val="462397824"/>
+        <p14:creationId xmlns:p14="http://schemas.microsoft.com/office/powerpoint/2010/main" val="2042961934"/>
       </p:ext>
     </p:extLst>
   </p:cSld>
@@ -597,7 +619,7 @@
           <a:bodyPr/>
           <a:lstStyle/>
           <a:p>
-            <a:fld id="{B4201859-69E5-694B-877D-D67120E65E95}" type="datetimeFigureOut">
+            <a:fld id="{A5CA952A-A168-7946-87B3-921B1C20AEAD}" type="datetimeFigureOut">
               <a:rPr lang="en-US" smtClean="0"/>
               <a:t>6/5/17</a:t>
             </a:fld>
@@ -639,7 +661,7 @@
           <a:bodyPr/>
           <a:lstStyle/>
           <a:p>
-            <a:fld id="{ACC61EC1-E771-5442-A114-2FBE91115F71}" type="slidenum">
+            <a:fld id="{E6F8BD7E-4C52-8B4C-AFA9-5162FA36B05B}" type="slidenum">
               <a:rPr lang="en-US" smtClean="0"/>
               <a:t>‹#›</a:t>
             </a:fld>
@@ -650,7 +672,7 @@
     </p:spTree>
     <p:extLst>
       <p:ext uri="{BB962C8B-B14F-4D97-AF65-F5344CB8AC3E}">
-        <p14:creationId xmlns:p14="http://schemas.microsoft.com/office/powerpoint/2010/main" val="1924393122"/>
+        <p14:creationId xmlns:p14="http://schemas.microsoft.com/office/powerpoint/2010/main" val="2092676502"/>
       </p:ext>
     </p:extLst>
   </p:cSld>
@@ -767,7 +789,7 @@
           <a:bodyPr/>
           <a:lstStyle/>
           <a:p>
-            <a:fld id="{B4201859-69E5-694B-877D-D67120E65E95}" type="datetimeFigureOut">
+            <a:fld id="{A5CA952A-A168-7946-87B3-921B1C20AEAD}" type="datetimeFigureOut">
               <a:rPr lang="en-US" smtClean="0"/>
               <a:t>6/5/17</a:t>
             </a:fld>
@@ -809,7 +831,7 @@
           <a:bodyPr/>
           <a:lstStyle/>
           <a:p>
-            <a:fld id="{ACC61EC1-E771-5442-A114-2FBE91115F71}" type="slidenum">
+            <a:fld id="{E6F8BD7E-4C52-8B4C-AFA9-5162FA36B05B}" type="slidenum">
               <a:rPr lang="en-US" smtClean="0"/>
               <a:t>‹#›</a:t>
             </a:fld>
@@ -820,7 +842,7 @@
     </p:spTree>
     <p:extLst>
       <p:ext uri="{BB962C8B-B14F-4D97-AF65-F5344CB8AC3E}">
-        <p14:creationId xmlns:p14="http://schemas.microsoft.com/office/powerpoint/2010/main" val="2117338519"/>
+        <p14:creationId xmlns:p14="http://schemas.microsoft.com/office/powerpoint/2010/main" val="519960063"/>
       </p:ext>
     </p:extLst>
   </p:cSld>
@@ -1013,7 +1035,7 @@
           <a:bodyPr/>
           <a:lstStyle/>
           <a:p>
-            <a:fld id="{B4201859-69E5-694B-877D-D67120E65E95}" type="datetimeFigureOut">
+            <a:fld id="{A5CA952A-A168-7946-87B3-921B1C20AEAD}" type="datetimeFigureOut">
               <a:rPr lang="en-US" smtClean="0"/>
               <a:t>6/5/17</a:t>
             </a:fld>
@@ -1055,7 +1077,7 @@
           <a:bodyPr/>
           <a:lstStyle/>
           <a:p>
-            <a:fld id="{ACC61EC1-E771-5442-A114-2FBE91115F71}" type="slidenum">
+            <a:fld id="{E6F8BD7E-4C52-8B4C-AFA9-5162FA36B05B}" type="slidenum">
               <a:rPr lang="en-US" smtClean="0"/>
               <a:t>‹#›</a:t>
             </a:fld>
@@ -1066,7 +1088,7 @@
     </p:spTree>
     <p:extLst>
       <p:ext uri="{BB962C8B-B14F-4D97-AF65-F5344CB8AC3E}">
-        <p14:creationId xmlns:p14="http://schemas.microsoft.com/office/powerpoint/2010/main" val="156974396"/>
+        <p14:creationId xmlns:p14="http://schemas.microsoft.com/office/powerpoint/2010/main" val="857819198"/>
       </p:ext>
     </p:extLst>
   </p:cSld>
@@ -1245,7 +1267,7 @@
           <a:bodyPr/>
           <a:lstStyle/>
           <a:p>
-            <a:fld id="{B4201859-69E5-694B-877D-D67120E65E95}" type="datetimeFigureOut">
+            <a:fld id="{A5CA952A-A168-7946-87B3-921B1C20AEAD}" type="datetimeFigureOut">
               <a:rPr lang="en-US" smtClean="0"/>
               <a:t>6/5/17</a:t>
             </a:fld>
@@ -1287,7 +1309,7 @@
           <a:bodyPr/>
           <a:lstStyle/>
           <a:p>
-            <a:fld id="{ACC61EC1-E771-5442-A114-2FBE91115F71}" type="slidenum">
+            <a:fld id="{E6F8BD7E-4C52-8B4C-AFA9-5162FA36B05B}" type="slidenum">
               <a:rPr lang="en-US" smtClean="0"/>
               <a:t>‹#›</a:t>
             </a:fld>
@@ -1298,7 +1320,7 @@
     </p:spTree>
     <p:extLst>
       <p:ext uri="{BB962C8B-B14F-4D97-AF65-F5344CB8AC3E}">
-        <p14:creationId xmlns:p14="http://schemas.microsoft.com/office/powerpoint/2010/main" val="1158755056"/>
+        <p14:creationId xmlns:p14="http://schemas.microsoft.com/office/powerpoint/2010/main" val="1309538475"/>
       </p:ext>
     </p:extLst>
   </p:cSld>
@@ -1612,7 +1634,7 @@
           <a:bodyPr/>
           <a:lstStyle/>
           <a:p>
-            <a:fld id="{B4201859-69E5-694B-877D-D67120E65E95}" type="datetimeFigureOut">
+            <a:fld id="{A5CA952A-A168-7946-87B3-921B1C20AEAD}" type="datetimeFigureOut">
               <a:rPr lang="en-US" smtClean="0"/>
               <a:t>6/5/17</a:t>
             </a:fld>
@@ -1654,7 +1676,7 @@
           <a:bodyPr/>
           <a:lstStyle/>
           <a:p>
-            <a:fld id="{ACC61EC1-E771-5442-A114-2FBE91115F71}" type="slidenum">
+            <a:fld id="{E6F8BD7E-4C52-8B4C-AFA9-5162FA36B05B}" type="slidenum">
               <a:rPr lang="en-US" smtClean="0"/>
               <a:t>‹#›</a:t>
             </a:fld>
@@ -1665,7 +1687,7 @@
     </p:spTree>
     <p:extLst>
       <p:ext uri="{BB962C8B-B14F-4D97-AF65-F5344CB8AC3E}">
-        <p14:creationId xmlns:p14="http://schemas.microsoft.com/office/powerpoint/2010/main" val="1814515196"/>
+        <p14:creationId xmlns:p14="http://schemas.microsoft.com/office/powerpoint/2010/main" val="2000734869"/>
       </p:ext>
     </p:extLst>
   </p:cSld>
@@ -1730,7 +1752,7 @@
           <a:bodyPr/>
           <a:lstStyle/>
           <a:p>
-            <a:fld id="{B4201859-69E5-694B-877D-D67120E65E95}" type="datetimeFigureOut">
+            <a:fld id="{A5CA952A-A168-7946-87B3-921B1C20AEAD}" type="datetimeFigureOut">
               <a:rPr lang="en-US" smtClean="0"/>
               <a:t>6/5/17</a:t>
             </a:fld>
@@ -1772,7 +1794,7 @@
           <a:bodyPr/>
           <a:lstStyle/>
           <a:p>
-            <a:fld id="{ACC61EC1-E771-5442-A114-2FBE91115F71}" type="slidenum">
+            <a:fld id="{E6F8BD7E-4C52-8B4C-AFA9-5162FA36B05B}" type="slidenum">
               <a:rPr lang="en-US" smtClean="0"/>
               <a:t>‹#›</a:t>
             </a:fld>
@@ -1783,7 +1805,7 @@
     </p:spTree>
     <p:extLst>
       <p:ext uri="{BB962C8B-B14F-4D97-AF65-F5344CB8AC3E}">
-        <p14:creationId xmlns:p14="http://schemas.microsoft.com/office/powerpoint/2010/main" val="141628125"/>
+        <p14:creationId xmlns:p14="http://schemas.microsoft.com/office/powerpoint/2010/main" val="1051998557"/>
       </p:ext>
     </p:extLst>
   </p:cSld>
@@ -1825,7 +1847,7 @@
           <a:bodyPr/>
           <a:lstStyle/>
           <a:p>
-            <a:fld id="{B4201859-69E5-694B-877D-D67120E65E95}" type="datetimeFigureOut">
+            <a:fld id="{A5CA952A-A168-7946-87B3-921B1C20AEAD}" type="datetimeFigureOut">
               <a:rPr lang="en-US" smtClean="0"/>
               <a:t>6/5/17</a:t>
             </a:fld>
@@ -1867,7 +1889,7 @@
           <a:bodyPr/>
           <a:lstStyle/>
           <a:p>
-            <a:fld id="{ACC61EC1-E771-5442-A114-2FBE91115F71}" type="slidenum">
+            <a:fld id="{E6F8BD7E-4C52-8B4C-AFA9-5162FA36B05B}" type="slidenum">
               <a:rPr lang="en-US" smtClean="0"/>
               <a:t>‹#›</a:t>
             </a:fld>
@@ -1878,7 +1900,7 @@
     </p:spTree>
     <p:extLst>
       <p:ext uri="{BB962C8B-B14F-4D97-AF65-F5344CB8AC3E}">
-        <p14:creationId xmlns:p14="http://schemas.microsoft.com/office/powerpoint/2010/main" val="932015999"/>
+        <p14:creationId xmlns:p14="http://schemas.microsoft.com/office/powerpoint/2010/main" val="706881748"/>
       </p:ext>
     </p:extLst>
   </p:cSld>
@@ -2102,7 +2124,7 @@
           <a:bodyPr/>
           <a:lstStyle/>
           <a:p>
-            <a:fld id="{B4201859-69E5-694B-877D-D67120E65E95}" type="datetimeFigureOut">
+            <a:fld id="{A5CA952A-A168-7946-87B3-921B1C20AEAD}" type="datetimeFigureOut">
               <a:rPr lang="en-US" smtClean="0"/>
               <a:t>6/5/17</a:t>
             </a:fld>
@@ -2144,7 +2166,7 @@
           <a:bodyPr/>
           <a:lstStyle/>
           <a:p>
-            <a:fld id="{ACC61EC1-E771-5442-A114-2FBE91115F71}" type="slidenum">
+            <a:fld id="{E6F8BD7E-4C52-8B4C-AFA9-5162FA36B05B}" type="slidenum">
               <a:rPr lang="en-US" smtClean="0"/>
               <a:t>‹#›</a:t>
             </a:fld>
@@ -2155,7 +2177,7 @@
     </p:spTree>
     <p:extLst>
       <p:ext uri="{BB962C8B-B14F-4D97-AF65-F5344CB8AC3E}">
-        <p14:creationId xmlns:p14="http://schemas.microsoft.com/office/powerpoint/2010/main" val="647173975"/>
+        <p14:creationId xmlns:p14="http://schemas.microsoft.com/office/powerpoint/2010/main" val="682003432"/>
       </p:ext>
     </p:extLst>
   </p:cSld>
@@ -2355,7 +2377,7 @@
           <a:bodyPr/>
           <a:lstStyle/>
           <a:p>
-            <a:fld id="{B4201859-69E5-694B-877D-D67120E65E95}" type="datetimeFigureOut">
+            <a:fld id="{A5CA952A-A168-7946-87B3-921B1C20AEAD}" type="datetimeFigureOut">
               <a:rPr lang="en-US" smtClean="0"/>
               <a:t>6/5/17</a:t>
             </a:fld>
@@ -2397,7 +2419,7 @@
           <a:bodyPr/>
           <a:lstStyle/>
           <a:p>
-            <a:fld id="{ACC61EC1-E771-5442-A114-2FBE91115F71}" type="slidenum">
+            <a:fld id="{E6F8BD7E-4C52-8B4C-AFA9-5162FA36B05B}" type="slidenum">
               <a:rPr lang="en-US" smtClean="0"/>
               <a:t>‹#›</a:t>
             </a:fld>
@@ -2408,7 +2430,7 @@
     </p:spTree>
     <p:extLst>
       <p:ext uri="{BB962C8B-B14F-4D97-AF65-F5344CB8AC3E}">
-        <p14:creationId xmlns:p14="http://schemas.microsoft.com/office/powerpoint/2010/main" val="48325770"/>
+        <p14:creationId xmlns:p14="http://schemas.microsoft.com/office/powerpoint/2010/main" val="1311457585"/>
       </p:ext>
     </p:extLst>
   </p:cSld>
@@ -2568,7 +2590,7 @@
             </a:lvl1pPr>
           </a:lstStyle>
           <a:p>
-            <a:fld id="{B4201859-69E5-694B-877D-D67120E65E95}" type="datetimeFigureOut">
+            <a:fld id="{A5CA952A-A168-7946-87B3-921B1C20AEAD}" type="datetimeFigureOut">
               <a:rPr lang="en-US" smtClean="0"/>
               <a:t>6/5/17</a:t>
             </a:fld>
@@ -2646,7 +2668,7 @@
             </a:lvl1pPr>
           </a:lstStyle>
           <a:p>
-            <a:fld id="{ACC61EC1-E771-5442-A114-2FBE91115F71}" type="slidenum">
+            <a:fld id="{E6F8BD7E-4C52-8B4C-AFA9-5162FA36B05B}" type="slidenum">
               <a:rPr lang="en-US" smtClean="0"/>
               <a:t>‹#›</a:t>
             </a:fld>
@@ -2657,7 +2679,7 @@
     </p:spTree>
     <p:extLst>
       <p:ext uri="{BB962C8B-B14F-4D97-AF65-F5344CB8AC3E}">
-        <p14:creationId xmlns:p14="http://schemas.microsoft.com/office/powerpoint/2010/main" val="1563300827"/>
+        <p14:creationId xmlns:p14="http://schemas.microsoft.com/office/powerpoint/2010/main" val="1132079643"/>
       </p:ext>
     </p:extLst>
   </p:cSld>
@@ -2991,12 +3013,8 @@
           <a:lstStyle/>
           <a:p>
             <a:r>
-              <a:rPr lang="en-US" dirty="0" err="1" smtClean="0"/>
-              <a:t>Git</a:t>
-            </a:r>
-            <a:r>
               <a:rPr lang="en-US" dirty="0" smtClean="0"/>
-              <a:t> Workflow</a:t>
+              <a:t>Forking Workflow</a:t>
             </a:r>
             <a:endParaRPr lang="en-US" dirty="0"/>
           </a:p>
@@ -3019,7 +3037,7 @@
           <a:p>
             <a:r>
               <a:rPr lang="en-US" dirty="0" smtClean="0"/>
-              <a:t>Carlo </a:t>
+              <a:t>By Carlo </a:t>
             </a:r>
             <a:r>
               <a:rPr lang="en-US" dirty="0" err="1" smtClean="0"/>
@@ -3032,402 +3050,7 @@
     </p:spTree>
     <p:extLst>
       <p:ext uri="{BB962C8B-B14F-4D97-AF65-F5344CB8AC3E}">
-        <p14:creationId xmlns:p14="http://schemas.microsoft.com/office/powerpoint/2010/main" val="23993987"/>
-      </p:ext>
-    </p:extLst>
-  </p:cSld>
-  <p:clrMapOvr>
-    <a:masterClrMapping/>
-  </p:clrMapOvr>
-</p:sld>
-</file>
-
-<file path=ppt/slides/slide10.xml><?xml version="1.0" encoding="utf-8"?>
-<p:sld xmlns:a="http://schemas.openxmlformats.org/drawingml/2006/main" xmlns:r="http://schemas.openxmlformats.org/officeDocument/2006/relationships" xmlns:p="http://schemas.openxmlformats.org/presentationml/2006/main">
-  <p:cSld>
-    <p:spTree>
-      <p:nvGrpSpPr>
-        <p:cNvPr id="1" name=""/>
-        <p:cNvGrpSpPr/>
-        <p:nvPr/>
-      </p:nvGrpSpPr>
-      <p:grpSpPr>
-        <a:xfrm>
-          <a:off x="0" y="0"/>
-          <a:ext cx="0" cy="0"/>
-          <a:chOff x="0" y="0"/>
-          <a:chExt cx="0" cy="0"/>
-        </a:xfrm>
-      </p:grpSpPr>
-      <p:sp>
-        <p:nvSpPr>
-          <p:cNvPr id="2" name="Title 1"/>
-          <p:cNvSpPr>
-            <a:spLocks noGrp="1"/>
-          </p:cNvSpPr>
-          <p:nvPr>
-            <p:ph type="title"/>
-          </p:nvPr>
-        </p:nvSpPr>
-        <p:spPr/>
-        <p:txBody>
-          <a:bodyPr/>
-          <a:lstStyle/>
-          <a:p>
-            <a:r>
-              <a:rPr lang="en-US" dirty="0" smtClean="0"/>
-              <a:t>Prepare a Release </a:t>
-            </a:r>
-            <a:endParaRPr lang="en-US" dirty="0"/>
-          </a:p>
-        </p:txBody>
-      </p:sp>
-      <p:sp>
-        <p:nvSpPr>
-          <p:cNvPr id="3" name="Content Placeholder 2"/>
-          <p:cNvSpPr>
-            <a:spLocks noGrp="1"/>
-          </p:cNvSpPr>
-          <p:nvPr>
-            <p:ph idx="1"/>
-          </p:nvPr>
-        </p:nvSpPr>
-        <p:spPr/>
-        <p:txBody>
-          <a:bodyPr/>
-          <a:lstStyle/>
-          <a:p>
-            <a:r>
-              <a:rPr lang="en-US" dirty="0" smtClean="0"/>
-              <a:t>Tag </a:t>
-            </a:r>
-            <a:r>
-              <a:rPr lang="en-US" dirty="0"/>
-              <a:t>the commit for easy </a:t>
-            </a:r>
-            <a:r>
-              <a:rPr lang="en-US" dirty="0" smtClean="0"/>
-              <a:t>reference.</a:t>
-            </a:r>
-          </a:p>
-          <a:p>
-            <a:endParaRPr lang="en-US" dirty="0"/>
-          </a:p>
-        </p:txBody>
-      </p:sp>
-      <p:pic>
-        <p:nvPicPr>
-          <p:cNvPr id="5" name="Picture 4"/>
-          <p:cNvPicPr>
-            <a:picLocks noChangeAspect="1"/>
-          </p:cNvPicPr>
-          <p:nvPr/>
-        </p:nvPicPr>
-        <p:blipFill>
-          <a:blip r:embed="rId2">
-            <a:extLst>
-              <a:ext uri="{28A0092B-C50C-407E-A947-70E740481C1C}">
-                <a14:useLocalDpi xmlns:a14="http://schemas.microsoft.com/office/drawing/2010/main" val="0"/>
-              </a:ext>
-            </a:extLst>
-          </a:blip>
-          <a:stretch>
-            <a:fillRect/>
-          </a:stretch>
-        </p:blipFill>
-        <p:spPr>
-          <a:xfrm>
-            <a:off x="2749550" y="3084830"/>
-            <a:ext cx="6692900" cy="711200"/>
-          </a:xfrm>
-          <a:prstGeom prst="rect">
-            <a:avLst/>
-          </a:prstGeom>
-        </p:spPr>
-      </p:pic>
-    </p:spTree>
-    <p:extLst>
-      <p:ext uri="{BB962C8B-B14F-4D97-AF65-F5344CB8AC3E}">
-        <p14:creationId xmlns:p14="http://schemas.microsoft.com/office/powerpoint/2010/main" val="2014071677"/>
-      </p:ext>
-    </p:extLst>
-  </p:cSld>
-  <p:clrMapOvr>
-    <a:masterClrMapping/>
-  </p:clrMapOvr>
-</p:sld>
-</file>
-
-<file path=ppt/slides/slide11.xml><?xml version="1.0" encoding="utf-8"?>
-<p:sld xmlns:a="http://schemas.openxmlformats.org/drawingml/2006/main" xmlns:r="http://schemas.openxmlformats.org/officeDocument/2006/relationships" xmlns:p="http://schemas.openxmlformats.org/presentationml/2006/main">
-  <p:cSld>
-    <p:spTree>
-      <p:nvGrpSpPr>
-        <p:cNvPr id="1" name=""/>
-        <p:cNvGrpSpPr/>
-        <p:nvPr/>
-      </p:nvGrpSpPr>
-      <p:grpSpPr>
-        <a:xfrm>
-          <a:off x="0" y="0"/>
-          <a:ext cx="0" cy="0"/>
-          <a:chOff x="0" y="0"/>
-          <a:chExt cx="0" cy="0"/>
-        </a:xfrm>
-      </p:grpSpPr>
-      <p:sp>
-        <p:nvSpPr>
-          <p:cNvPr id="2" name="Title 1"/>
-          <p:cNvSpPr>
-            <a:spLocks noGrp="1"/>
-          </p:cNvSpPr>
-          <p:nvPr>
-            <p:ph type="title"/>
-          </p:nvPr>
-        </p:nvSpPr>
-        <p:spPr>
-          <a:xfrm>
-            <a:off x="838200" y="365125"/>
-            <a:ext cx="10515600" cy="1325563"/>
-          </a:xfrm>
-        </p:spPr>
-        <p:txBody>
-          <a:bodyPr/>
-          <a:lstStyle/>
-          <a:p>
-            <a:r>
-              <a:rPr lang="en-US" dirty="0"/>
-              <a:t>Maintenance </a:t>
-            </a:r>
-            <a:r>
-              <a:rPr lang="en-US" dirty="0" smtClean="0"/>
-              <a:t>Branches</a:t>
-            </a:r>
-            <a:endParaRPr lang="en-US" dirty="0"/>
-          </a:p>
-        </p:txBody>
-      </p:sp>
-      <p:sp>
-        <p:nvSpPr>
-          <p:cNvPr id="3" name="Content Placeholder 2"/>
-          <p:cNvSpPr>
-            <a:spLocks noGrp="1"/>
-          </p:cNvSpPr>
-          <p:nvPr>
-            <p:ph idx="1"/>
-          </p:nvPr>
-        </p:nvSpPr>
-        <p:spPr/>
-        <p:txBody>
-          <a:bodyPr/>
-          <a:lstStyle/>
-          <a:p>
-            <a:r>
-              <a:rPr lang="en-US" dirty="0"/>
-              <a:t>Maintenance or “hotfix” branches are used to quickly patch production releases.</a:t>
-            </a:r>
-          </a:p>
-        </p:txBody>
-      </p:sp>
-      <p:pic>
-        <p:nvPicPr>
-          <p:cNvPr id="4" name="Picture 3"/>
-          <p:cNvPicPr>
-            <a:picLocks noChangeAspect="1"/>
-          </p:cNvPicPr>
-          <p:nvPr/>
-        </p:nvPicPr>
-        <p:blipFill>
-          <a:blip r:embed="rId2">
-            <a:extLst>
-              <a:ext uri="{28A0092B-C50C-407E-A947-70E740481C1C}">
-                <a14:useLocalDpi xmlns:a14="http://schemas.microsoft.com/office/drawing/2010/main" val="0"/>
-              </a:ext>
-            </a:extLst>
-          </a:blip>
-          <a:stretch>
-            <a:fillRect/>
-          </a:stretch>
-        </p:blipFill>
-        <p:spPr>
-          <a:xfrm>
-            <a:off x="4526281" y="2251882"/>
-            <a:ext cx="6046470" cy="4316538"/>
-          </a:xfrm>
-          <a:prstGeom prst="rect">
-            <a:avLst/>
-          </a:prstGeom>
-        </p:spPr>
-      </p:pic>
-    </p:spTree>
-    <p:extLst>
-      <p:ext uri="{BB962C8B-B14F-4D97-AF65-F5344CB8AC3E}">
-        <p14:creationId xmlns:p14="http://schemas.microsoft.com/office/powerpoint/2010/main" val="230802759"/>
-      </p:ext>
-    </p:extLst>
-  </p:cSld>
-  <p:clrMapOvr>
-    <a:masterClrMapping/>
-  </p:clrMapOvr>
-</p:sld>
-</file>
-
-<file path=ppt/slides/slide12.xml><?xml version="1.0" encoding="utf-8"?>
-<p:sld xmlns:a="http://schemas.openxmlformats.org/drawingml/2006/main" xmlns:r="http://schemas.openxmlformats.org/officeDocument/2006/relationships" xmlns:p="http://schemas.openxmlformats.org/presentationml/2006/main">
-  <p:cSld>
-    <p:spTree>
-      <p:nvGrpSpPr>
-        <p:cNvPr id="1" name=""/>
-        <p:cNvGrpSpPr/>
-        <p:nvPr/>
-      </p:nvGrpSpPr>
-      <p:grpSpPr>
-        <a:xfrm>
-          <a:off x="0" y="0"/>
-          <a:ext cx="0" cy="0"/>
-          <a:chOff x="0" y="0"/>
-          <a:chExt cx="0" cy="0"/>
-        </a:xfrm>
-      </p:grpSpPr>
-      <p:sp>
-        <p:nvSpPr>
-          <p:cNvPr id="2" name="Title 1"/>
-          <p:cNvSpPr>
-            <a:spLocks noGrp="1"/>
-          </p:cNvSpPr>
-          <p:nvPr>
-            <p:ph type="title"/>
-          </p:nvPr>
-        </p:nvSpPr>
-        <p:spPr/>
-        <p:txBody>
-          <a:bodyPr/>
-          <a:lstStyle/>
-          <a:p>
-            <a:r>
-              <a:rPr lang="en-US" dirty="0" smtClean="0"/>
-              <a:t>Prepare a </a:t>
-            </a:r>
-            <a:r>
-              <a:rPr lang="en-US" dirty="0" smtClean="0"/>
-              <a:t>Maintenance Branch</a:t>
-            </a:r>
-            <a:endParaRPr lang="en-US" dirty="0"/>
-          </a:p>
-        </p:txBody>
-      </p:sp>
-      <p:sp>
-        <p:nvSpPr>
-          <p:cNvPr id="5" name="Content Placeholder 4"/>
-          <p:cNvSpPr>
-            <a:spLocks noGrp="1"/>
-          </p:cNvSpPr>
-          <p:nvPr>
-            <p:ph idx="1"/>
-          </p:nvPr>
-        </p:nvSpPr>
-        <p:spPr/>
-        <p:txBody>
-          <a:bodyPr/>
-          <a:lstStyle/>
-          <a:p>
-            <a:r>
-              <a:rPr lang="en-US" dirty="0" smtClean="0"/>
-              <a:t>When an end-user </a:t>
-            </a:r>
-            <a:r>
-              <a:rPr lang="en-US" dirty="0"/>
-              <a:t>discovers a </a:t>
-            </a:r>
-            <a:r>
-              <a:rPr lang="en-US" dirty="0" smtClean="0"/>
-              <a:t>bug fork from master.</a:t>
-            </a:r>
-          </a:p>
-          <a:p>
-            <a:endParaRPr lang="en-US" dirty="0"/>
-          </a:p>
-          <a:p>
-            <a:endParaRPr lang="en-US" dirty="0" smtClean="0"/>
-          </a:p>
-          <a:p>
-            <a:endParaRPr lang="en-US" dirty="0"/>
-          </a:p>
-          <a:p>
-            <a:r>
-              <a:rPr lang="en-US" dirty="0" smtClean="0"/>
-              <a:t>After fixing bug merge the branch back to master.</a:t>
-            </a:r>
-          </a:p>
-          <a:p>
-            <a:endParaRPr lang="en-US" dirty="0" smtClean="0"/>
-          </a:p>
-        </p:txBody>
-      </p:sp>
-      <p:pic>
-        <p:nvPicPr>
-          <p:cNvPr id="6" name="Picture 5"/>
-          <p:cNvPicPr>
-            <a:picLocks noChangeAspect="1"/>
-          </p:cNvPicPr>
-          <p:nvPr/>
-        </p:nvPicPr>
-        <p:blipFill>
-          <a:blip r:embed="rId2">
-            <a:extLst>
-              <a:ext uri="{28A0092B-C50C-407E-A947-70E740481C1C}">
-                <a14:useLocalDpi xmlns:a14="http://schemas.microsoft.com/office/drawing/2010/main" val="0"/>
-              </a:ext>
-            </a:extLst>
-          </a:blip>
-          <a:stretch>
-            <a:fillRect/>
-          </a:stretch>
-        </p:blipFill>
-        <p:spPr>
-          <a:xfrm>
-            <a:off x="2749550" y="2332832"/>
-            <a:ext cx="6692900" cy="1371600"/>
-          </a:xfrm>
-          <a:prstGeom prst="rect">
-            <a:avLst/>
-          </a:prstGeom>
-        </p:spPr>
-      </p:pic>
-      <p:pic>
-        <p:nvPicPr>
-          <p:cNvPr id="7" name="Picture 6"/>
-          <p:cNvPicPr>
-            <a:picLocks noChangeAspect="1"/>
-          </p:cNvPicPr>
-          <p:nvPr/>
-        </p:nvPicPr>
-        <p:blipFill>
-          <a:blip r:embed="rId3">
-            <a:extLst>
-              <a:ext uri="{28A0092B-C50C-407E-A947-70E740481C1C}">
-                <a14:useLocalDpi xmlns:a14="http://schemas.microsoft.com/office/drawing/2010/main" val="0"/>
-              </a:ext>
-            </a:extLst>
-          </a:blip>
-          <a:stretch>
-            <a:fillRect/>
-          </a:stretch>
-        </p:blipFill>
-        <p:spPr>
-          <a:xfrm>
-            <a:off x="2743200" y="4457700"/>
-            <a:ext cx="6705600" cy="1143000"/>
-          </a:xfrm>
-          <a:prstGeom prst="rect">
-            <a:avLst/>
-          </a:prstGeom>
-        </p:spPr>
-      </p:pic>
-    </p:spTree>
-    <p:extLst>
-      <p:ext uri="{BB962C8B-B14F-4D97-AF65-F5344CB8AC3E}">
-        <p14:creationId xmlns:p14="http://schemas.microsoft.com/office/powerpoint/2010/main" val="1744065927"/>
+        <p14:creationId xmlns:p14="http://schemas.microsoft.com/office/powerpoint/2010/main" val="126798548"/>
       </p:ext>
     </p:extLst>
   </p:cSld>
@@ -3470,8 +3093,24 @@
           <a:lstStyle/>
           <a:p>
             <a:r>
+              <a:rPr lang="en-US" dirty="0"/>
+              <a:t>T</a:t>
+            </a:r>
+            <a:r>
               <a:rPr lang="en-US" dirty="0" smtClean="0"/>
-              <a:t>Historical Branches</a:t>
+              <a:t>wo </a:t>
+            </a:r>
+            <a:r>
+              <a:rPr lang="en-US" dirty="0" err="1" smtClean="0"/>
+              <a:t>Git</a:t>
+            </a:r>
+            <a:r>
+              <a:rPr lang="en-US" dirty="0" smtClean="0"/>
+              <a:t> </a:t>
+            </a:r>
+            <a:r>
+              <a:rPr lang="en-US" dirty="0" err="1" smtClean="0"/>
+              <a:t>Tepositories</a:t>
             </a:r>
             <a:endParaRPr lang="en-US" dirty="0"/>
           </a:p>
@@ -3487,67 +3126,27 @@
             <p:ph idx="1"/>
           </p:nvPr>
         </p:nvSpPr>
-        <p:spPr/>
+        <p:spPr>
+          <a:xfrm>
+            <a:off x="838200" y="1690688"/>
+            <a:ext cx="10515600" cy="4351338"/>
+          </a:xfrm>
+        </p:spPr>
         <p:txBody>
           <a:bodyPr/>
           <a:lstStyle/>
           <a:p>
             <a:r>
               <a:rPr lang="en-US" dirty="0" smtClean="0"/>
-              <a:t>This </a:t>
-            </a:r>
-            <a:r>
-              <a:rPr lang="en-US" dirty="0"/>
-              <a:t>workflow uses two branches to </a:t>
-            </a:r>
-            <a:r>
-              <a:rPr lang="en-US" dirty="0" smtClean="0"/>
-              <a:t>record </a:t>
-            </a:r>
-            <a:r>
-              <a:rPr lang="en-US" dirty="0"/>
-              <a:t>the history of the project</a:t>
-            </a:r>
-            <a:r>
-              <a:rPr lang="en-US" dirty="0" smtClean="0"/>
-              <a:t>.</a:t>
-            </a:r>
-          </a:p>
-          <a:p>
-            <a:pPr lvl="1"/>
-            <a:r>
-              <a:rPr lang="en-US" dirty="0" smtClean="0"/>
-              <a:t>Master - Stores </a:t>
-            </a:r>
-            <a:r>
-              <a:rPr lang="en-US" dirty="0"/>
-              <a:t>the official release </a:t>
-            </a:r>
-            <a:r>
-              <a:rPr lang="en-US" dirty="0" smtClean="0"/>
-              <a:t>history</a:t>
-            </a:r>
-          </a:p>
-          <a:p>
-            <a:pPr lvl="1"/>
-            <a:r>
-              <a:rPr lang="en-US" dirty="0" smtClean="0"/>
-              <a:t>Develop - Serves </a:t>
-            </a:r>
-            <a:r>
-              <a:rPr lang="en-US" dirty="0"/>
-              <a:t>as an integration branch for features</a:t>
-            </a:r>
-            <a:r>
-              <a:rPr lang="en-US" dirty="0" smtClean="0"/>
-              <a:t>.</a:t>
-            </a:r>
+              <a:t>Private local one and a public server-side one.</a:t>
+            </a:r>
+            <a:endParaRPr lang="en-US" dirty="0"/>
           </a:p>
         </p:txBody>
       </p:sp>
       <p:pic>
         <p:nvPicPr>
-          <p:cNvPr id="4" name="Content Placeholder 3"/>
+          <p:cNvPr id="4" name="Picture 3"/>
           <p:cNvPicPr>
             <a:picLocks noChangeAspect="1"/>
           </p:cNvPicPr>
@@ -3567,18 +3166,108 @@
         </p:blipFill>
         <p:spPr>
           <a:xfrm>
-            <a:off x="2608430" y="3036935"/>
-            <a:ext cx="6975139" cy="3140028"/>
+            <a:off x="3568262" y="2262101"/>
+            <a:ext cx="5055475" cy="3784215"/>
           </a:xfrm>
           <a:prstGeom prst="rect">
             <a:avLst/>
           </a:prstGeom>
         </p:spPr>
       </p:pic>
+      <p:sp>
+        <p:nvSpPr>
+          <p:cNvPr id="5" name="TextBox 4"/>
+          <p:cNvSpPr txBox="1"/>
+          <p:nvPr/>
+        </p:nvSpPr>
+        <p:spPr>
+          <a:xfrm>
+            <a:off x="5720736" y="2262101"/>
+            <a:ext cx="750526" cy="369332"/>
+          </a:xfrm>
+          <a:prstGeom prst="rect">
+            <a:avLst/>
+          </a:prstGeom>
+          <a:noFill/>
+        </p:spPr>
+        <p:txBody>
+          <a:bodyPr wrap="none" rtlCol="0">
+            <a:spAutoFit/>
+          </a:bodyPr>
+          <a:lstStyle/>
+          <a:p>
+            <a:r>
+              <a:rPr lang="en-US" smtClean="0"/>
+              <a:t>Public</a:t>
+            </a:r>
+            <a:endParaRPr lang="en-US"/>
+          </a:p>
+        </p:txBody>
+      </p:sp>
+      <p:sp>
+        <p:nvSpPr>
+          <p:cNvPr id="6" name="TextBox 5"/>
+          <p:cNvSpPr txBox="1"/>
+          <p:nvPr/>
+        </p:nvSpPr>
+        <p:spPr>
+          <a:xfrm>
+            <a:off x="3808565" y="2262101"/>
+            <a:ext cx="835934" cy="369332"/>
+          </a:xfrm>
+          <a:prstGeom prst="rect">
+            <a:avLst/>
+          </a:prstGeom>
+          <a:noFill/>
+        </p:spPr>
+        <p:txBody>
+          <a:bodyPr wrap="none" rtlCol="0">
+            <a:spAutoFit/>
+          </a:bodyPr>
+          <a:lstStyle/>
+          <a:p>
+            <a:r>
+              <a:rPr lang="en-US" smtClean="0"/>
+              <a:t>Private</a:t>
+            </a:r>
+            <a:endParaRPr lang="en-US"/>
+          </a:p>
+        </p:txBody>
+      </p:sp>
+      <p:sp>
+        <p:nvSpPr>
+          <p:cNvPr id="7" name="TextBox 6"/>
+          <p:cNvSpPr txBox="1"/>
+          <p:nvPr/>
+        </p:nvSpPr>
+        <p:spPr>
+          <a:xfrm>
+            <a:off x="7547499" y="2262101"/>
+            <a:ext cx="835934" cy="369332"/>
+          </a:xfrm>
+          <a:prstGeom prst="rect">
+            <a:avLst/>
+          </a:prstGeom>
+          <a:noFill/>
+        </p:spPr>
+        <p:txBody>
+          <a:bodyPr wrap="none" rtlCol="0">
+            <a:spAutoFit/>
+          </a:bodyPr>
+          <a:lstStyle/>
+          <a:p>
+            <a:r>
+              <a:rPr lang="en-US" smtClean="0"/>
+              <a:t>Private</a:t>
+            </a:r>
+            <a:endParaRPr lang="en-US"/>
+          </a:p>
+        </p:txBody>
+      </p:sp>
     </p:spTree>
     <p:extLst>
       <p:ext uri="{BB962C8B-B14F-4D97-AF65-F5344CB8AC3E}">
-        <p14:creationId xmlns:p14="http://schemas.microsoft.com/office/powerpoint/2010/main" val="1986127815"/>
+        <p14:creationId xmlns:p14="http://schemas.microsoft.com/office/powerpoint/2010/main" val="374794122"/>
       </p:ext>
     </p:extLst>
   </p:cSld>
@@ -3622,7 +3311,7 @@
           <a:p>
             <a:r>
               <a:rPr lang="en-US" dirty="0" smtClean="0"/>
-              <a:t>Create a Develop Branch</a:t>
+              <a:t>Advantages of Forking Workflow</a:t>
             </a:r>
             <a:endParaRPr lang="en-US" dirty="0"/>
           </a:p>
@@ -3643,67 +3332,38 @@
           <a:bodyPr/>
           <a:lstStyle/>
           <a:p>
-            <a:r>
-              <a:rPr lang="en-US" dirty="0"/>
-              <a:t>The first step is to complement the default master with a develop branch. A simple way to do this is for one developer </a:t>
-            </a:r>
+            <a:endParaRPr lang="en-US" dirty="0" smtClean="0"/>
+          </a:p>
+          <a:p>
             <a:r>
               <a:rPr lang="en-US" dirty="0" smtClean="0"/>
-              <a:t>to create an empty develop branch locally</a:t>
-            </a:r>
-            <a:r>
-              <a:rPr lang="en-US" dirty="0"/>
-              <a:t> </a:t>
-            </a:r>
+              <a:t>Developers push to their own server-side repositories.</a:t>
+            </a:r>
+          </a:p>
+          <a:p>
+            <a:endParaRPr lang="en-US" dirty="0" smtClean="0"/>
+          </a:p>
+          <a:p>
             <a:r>
               <a:rPr lang="en-US" dirty="0" smtClean="0"/>
-              <a:t>and </a:t>
-            </a:r>
-            <a:r>
-              <a:rPr lang="en-US" dirty="0"/>
-              <a:t>push it to the </a:t>
-            </a:r>
+              <a:t>This allows project maintainer be the filter to the official codebase.</a:t>
+            </a:r>
+          </a:p>
+          <a:p>
+            <a:endParaRPr lang="en-US" dirty="0" smtClean="0"/>
+          </a:p>
+          <a:p>
             <a:r>
               <a:rPr lang="en-US" dirty="0" smtClean="0"/>
-              <a:t>server</a:t>
-            </a:r>
-          </a:p>
-        </p:txBody>
-      </p:sp>
-      <p:pic>
-        <p:nvPicPr>
-          <p:cNvPr id="4" name="Picture 3"/>
-          <p:cNvPicPr>
-            <a:picLocks noChangeAspect="1"/>
-          </p:cNvPicPr>
-          <p:nvPr/>
-        </p:nvPicPr>
-        <p:blipFill>
-          <a:blip r:embed="rId2">
-            <a:extLst>
-              <a:ext uri="{28A0092B-C50C-407E-A947-70E740481C1C}">
-                <a14:useLocalDpi xmlns:a14="http://schemas.microsoft.com/office/drawing/2010/main" val="0"/>
-              </a:ext>
-            </a:extLst>
-          </a:blip>
-          <a:stretch>
-            <a:fillRect/>
-          </a:stretch>
-        </p:blipFill>
-        <p:spPr>
-          <a:xfrm>
-            <a:off x="2743200" y="3632994"/>
-            <a:ext cx="6705600" cy="736600"/>
-          </a:xfrm>
-          <a:prstGeom prst="rect">
-            <a:avLst/>
-          </a:prstGeom>
-        </p:spPr>
-      </p:pic>
+              <a:t>This is ideal workflow for open source projects. </a:t>
+            </a:r>
+          </a:p>
+        </p:txBody>
+      </p:sp>
     </p:spTree>
     <p:extLst>
       <p:ext uri="{BB962C8B-B14F-4D97-AF65-F5344CB8AC3E}">
-        <p14:creationId xmlns:p14="http://schemas.microsoft.com/office/powerpoint/2010/main" val="166854336"/>
+        <p14:creationId xmlns:p14="http://schemas.microsoft.com/office/powerpoint/2010/main" val="2118275187"/>
       </p:ext>
     </p:extLst>
   </p:cSld>
@@ -3747,7 +3407,7 @@
           <a:p>
             <a:r>
               <a:rPr lang="en-US" dirty="0" smtClean="0"/>
-              <a:t>Clone Repo</a:t>
+              <a:t>Clone from forked repositories</a:t>
             </a:r>
             <a:endParaRPr lang="en-US" dirty="0"/>
           </a:p>
@@ -3755,7 +3415,7 @@
       </p:sp>
       <p:sp>
         <p:nvSpPr>
-          <p:cNvPr id="3" name="Content Placeholder 2"/>
+          <p:cNvPr id="6" name="Content Placeholder 5"/>
           <p:cNvSpPr>
             <a:spLocks noGrp="1"/>
           </p:cNvSpPr>
@@ -3770,32 +3430,15 @@
           <a:p>
             <a:r>
               <a:rPr lang="en-US" dirty="0" smtClean="0"/>
-              <a:t>Each developer should clone central repo with the develop branch to there local machine. </a:t>
-            </a:r>
-          </a:p>
-          <a:p>
+              <a:t>Clone from you own forked repositories.</a:t>
+            </a:r>
             <a:endParaRPr lang="en-US" dirty="0"/>
-          </a:p>
-          <a:p>
-            <a:endParaRPr lang="en-US" dirty="0" smtClean="0"/>
-          </a:p>
-          <a:p>
-            <a:endParaRPr lang="en-US" dirty="0"/>
-          </a:p>
-          <a:p>
-            <a:endParaRPr lang="en-US" dirty="0" smtClean="0"/>
-          </a:p>
-          <a:p>
-            <a:r>
-              <a:rPr lang="en-US" dirty="0"/>
-              <a:t>Everybody now has a local copy of the historical branches set up.</a:t>
-            </a:r>
           </a:p>
         </p:txBody>
       </p:sp>
       <p:pic>
         <p:nvPicPr>
-          <p:cNvPr id="4" name="Picture 3"/>
+          <p:cNvPr id="7" name="Picture 6"/>
           <p:cNvPicPr>
             <a:picLocks noChangeAspect="1"/>
           </p:cNvPicPr>
@@ -3815,8 +3458,38 @@
         </p:blipFill>
         <p:spPr>
           <a:xfrm>
-            <a:off x="2743200" y="3277394"/>
-            <a:ext cx="6705600" cy="723900"/>
+            <a:off x="2755900" y="2373304"/>
+            <a:ext cx="6680200" cy="508000"/>
+          </a:xfrm>
+          <a:prstGeom prst="rect">
+            <a:avLst/>
+          </a:prstGeom>
+        </p:spPr>
+      </p:pic>
+      <p:pic>
+        <p:nvPicPr>
+          <p:cNvPr id="8" name="Picture 7"/>
+          <p:cNvPicPr>
+            <a:picLocks noChangeAspect="1"/>
+          </p:cNvPicPr>
+          <p:nvPr/>
+        </p:nvPicPr>
+        <p:blipFill>
+          <a:blip r:embed="rId3">
+            <a:extLst>
+              <a:ext uri="{28A0092B-C50C-407E-A947-70E740481C1C}">
+                <a14:useLocalDpi xmlns:a14="http://schemas.microsoft.com/office/drawing/2010/main" val="0"/>
+              </a:ext>
+            </a:extLst>
+          </a:blip>
+          <a:stretch>
+            <a:fillRect/>
+          </a:stretch>
+        </p:blipFill>
+        <p:spPr>
+          <a:xfrm>
+            <a:off x="3869380" y="3040993"/>
+            <a:ext cx="4453239" cy="3412359"/>
           </a:xfrm>
           <a:prstGeom prst="rect">
             <a:avLst/>
@@ -3826,7 +3499,7 @@
     </p:spTree>
     <p:extLst>
       <p:ext uri="{BB962C8B-B14F-4D97-AF65-F5344CB8AC3E}">
-        <p14:creationId xmlns:p14="http://schemas.microsoft.com/office/powerpoint/2010/main" val="742576281"/>
+        <p14:creationId xmlns:p14="http://schemas.microsoft.com/office/powerpoint/2010/main" val="1868492370"/>
       </p:ext>
     </p:extLst>
   </p:cSld>
@@ -3869,12 +3542,8 @@
           <a:lstStyle/>
           <a:p>
             <a:r>
-              <a:rPr lang="en-US" dirty="0"/>
-              <a:t>Feature </a:t>
-            </a:r>
-            <a:r>
               <a:rPr lang="en-US" dirty="0" smtClean="0"/>
-              <a:t>Branches</a:t>
+              <a:t>Developers work on their features</a:t>
             </a:r>
             <a:endParaRPr lang="en-US" dirty="0"/>
           </a:p>
@@ -3890,187 +3559,32 @@
             <p:ph idx="1"/>
           </p:nvPr>
         </p:nvSpPr>
-        <p:spPr/>
-        <p:txBody>
-          <a:bodyPr/>
-          <a:lstStyle/>
-          <a:p>
-            <a:r>
-              <a:rPr lang="en-US" dirty="0" smtClean="0"/>
-              <a:t>Uses develop as its </a:t>
-            </a:r>
-            <a:r>
-              <a:rPr lang="en-US" dirty="0"/>
-              <a:t>parent </a:t>
-            </a:r>
-            <a:r>
-              <a:rPr lang="en-US" dirty="0" smtClean="0"/>
-              <a:t>branch. When feature is complete it gets merged into develop.</a:t>
-            </a:r>
-            <a:r>
-              <a:rPr lang="en-US" dirty="0"/>
-              <a:t> Features should never interact directly </a:t>
-            </a:r>
-            <a:r>
-              <a:rPr lang="en-US" dirty="0" smtClean="0"/>
-              <a:t>with master. </a:t>
-            </a:r>
-            <a:endParaRPr lang="en-US" dirty="0"/>
-          </a:p>
-        </p:txBody>
-      </p:sp>
-      <p:pic>
-        <p:nvPicPr>
-          <p:cNvPr id="5" name="Picture 4"/>
-          <p:cNvPicPr>
-            <a:picLocks noChangeAspect="1"/>
-          </p:cNvPicPr>
-          <p:nvPr/>
-        </p:nvPicPr>
-        <p:blipFill>
-          <a:blip r:embed="rId2">
-            <a:extLst>
-              <a:ext uri="{28A0092B-C50C-407E-A947-70E740481C1C}">
-                <a14:useLocalDpi xmlns:a14="http://schemas.microsoft.com/office/drawing/2010/main" val="0"/>
-              </a:ext>
-            </a:extLst>
-          </a:blip>
-          <a:stretch>
-            <a:fillRect/>
-          </a:stretch>
-        </p:blipFill>
         <p:spPr>
           <a:xfrm>
-            <a:off x="2649855" y="2608325"/>
-            <a:ext cx="6892290" cy="3828494"/>
+            <a:off x="838200" y="1846646"/>
+            <a:ext cx="10515600" cy="4351338"/>
           </a:xfrm>
-          <a:prstGeom prst="rect">
-            <a:avLst/>
-          </a:prstGeom>
         </p:spPr>
-      </p:pic>
-    </p:spTree>
-    <p:extLst>
-      <p:ext uri="{BB962C8B-B14F-4D97-AF65-F5344CB8AC3E}">
-        <p14:creationId xmlns:p14="http://schemas.microsoft.com/office/powerpoint/2010/main" val="419860760"/>
-      </p:ext>
-    </p:extLst>
-  </p:cSld>
-  <p:clrMapOvr>
-    <a:masterClrMapping/>
-  </p:clrMapOvr>
-</p:sld>
-</file>
-
-<file path=ppt/slides/slide6.xml><?xml version="1.0" encoding="utf-8"?>
-<p:sld xmlns:a="http://schemas.openxmlformats.org/drawingml/2006/main" xmlns:r="http://schemas.openxmlformats.org/officeDocument/2006/relationships" xmlns:p="http://schemas.openxmlformats.org/presentationml/2006/main">
-  <p:cSld>
-    <p:spTree>
-      <p:nvGrpSpPr>
-        <p:cNvPr id="1" name=""/>
-        <p:cNvGrpSpPr/>
-        <p:nvPr/>
-      </p:nvGrpSpPr>
-      <p:grpSpPr>
-        <a:xfrm>
-          <a:off x="0" y="0"/>
-          <a:ext cx="0" cy="0"/>
-          <a:chOff x="0" y="0"/>
-          <a:chExt cx="0" cy="0"/>
-        </a:xfrm>
-      </p:grpSpPr>
-      <p:sp>
-        <p:nvSpPr>
-          <p:cNvPr id="2" name="Title 1"/>
-          <p:cNvSpPr>
-            <a:spLocks noGrp="1"/>
-          </p:cNvSpPr>
-          <p:nvPr>
-            <p:ph type="title"/>
-          </p:nvPr>
-        </p:nvSpPr>
-        <p:spPr/>
         <p:txBody>
           <a:bodyPr/>
           <a:lstStyle/>
           <a:p>
             <a:r>
               <a:rPr lang="en-US" dirty="0" smtClean="0"/>
-              <a:t>Begin </a:t>
-            </a:r>
-            <a:r>
-              <a:rPr lang="en-US" dirty="0"/>
-              <a:t>new features</a:t>
-            </a:r>
-            <a:br>
-              <a:rPr lang="en-US" dirty="0"/>
-            </a:br>
+              <a:t>In local repositories that was just cloned, developers can edit code, commit changes, and create branches</a:t>
+            </a:r>
+          </a:p>
+          <a:p>
             <a:endParaRPr lang="en-US" dirty="0"/>
           </a:p>
-        </p:txBody>
-      </p:sp>
-      <p:sp>
-        <p:nvSpPr>
-          <p:cNvPr id="3" name="Content Placeholder 2"/>
-          <p:cNvSpPr>
-            <a:spLocks noGrp="1"/>
-          </p:cNvSpPr>
-          <p:nvPr>
-            <p:ph idx="1"/>
-          </p:nvPr>
-        </p:nvSpPr>
-        <p:spPr/>
-        <p:txBody>
-          <a:bodyPr/>
-          <a:lstStyle/>
+          <a:p>
+            <a:endParaRPr lang="en-US" dirty="0" smtClean="0"/>
+          </a:p>
           <a:p>
             <a:r>
               <a:rPr lang="en-US" dirty="0" smtClean="0"/>
-              <a:t>First create a branch </a:t>
-            </a:r>
-            <a:r>
-              <a:rPr lang="en-US" dirty="0"/>
-              <a:t>for </a:t>
-            </a:r>
-            <a:r>
-              <a:rPr lang="en-US" dirty="0" smtClean="0"/>
-              <a:t>a </a:t>
-            </a:r>
-            <a:r>
-              <a:rPr lang="en-US" dirty="0"/>
-              <a:t>features</a:t>
-            </a:r>
-            <a:r>
-              <a:rPr lang="en-US" dirty="0" smtClean="0"/>
-              <a:t>. (make name descriptive)</a:t>
-            </a:r>
-          </a:p>
-          <a:p>
-            <a:endParaRPr lang="en-US" dirty="0" smtClean="0"/>
-          </a:p>
-          <a:p>
-            <a:endParaRPr lang="en-US" dirty="0"/>
-          </a:p>
-          <a:p>
-            <a:endParaRPr lang="en-US" dirty="0" smtClean="0"/>
-          </a:p>
-          <a:p>
-            <a:r>
-              <a:rPr lang="en-US" dirty="0" smtClean="0"/>
-              <a:t>Add </a:t>
-            </a:r>
-            <a:r>
-              <a:rPr lang="en-US" dirty="0"/>
-              <a:t>commits to the feature branch in the usual fashion: edit, stage, </a:t>
-            </a:r>
-            <a:r>
-              <a:rPr lang="en-US" dirty="0" smtClean="0"/>
-              <a:t>commit. </a:t>
-            </a:r>
-            <a:endParaRPr lang="en-US" dirty="0"/>
-          </a:p>
-          <a:p>
-            <a:endParaRPr lang="en-US" dirty="0"/>
+              <a:t>When project has moved forward, to update new commits do command</a:t>
+            </a:r>
           </a:p>
         </p:txBody>
       </p:sp>
@@ -4096,8 +3610,8 @@
         </p:blipFill>
         <p:spPr>
           <a:xfrm>
-            <a:off x="2755900" y="2689223"/>
-            <a:ext cx="6692900" cy="495300"/>
+            <a:off x="2736850" y="2767724"/>
+            <a:ext cx="6718300" cy="952500"/>
           </a:xfrm>
           <a:prstGeom prst="rect">
             <a:avLst/>
@@ -4126,8 +3640,8 @@
         </p:blipFill>
         <p:spPr>
           <a:xfrm>
-            <a:off x="2755900" y="4802187"/>
-            <a:ext cx="6680200" cy="927100"/>
+            <a:off x="2736850" y="4877677"/>
+            <a:ext cx="6692900" cy="508000"/>
           </a:xfrm>
           <a:prstGeom prst="rect">
             <a:avLst/>
@@ -4137,7 +3651,142 @@
     </p:spTree>
     <p:extLst>
       <p:ext uri="{BB962C8B-B14F-4D97-AF65-F5344CB8AC3E}">
-        <p14:creationId xmlns:p14="http://schemas.microsoft.com/office/powerpoint/2010/main" val="1547082248"/>
+        <p14:creationId xmlns:p14="http://schemas.microsoft.com/office/powerpoint/2010/main" val="380637168"/>
+      </p:ext>
+    </p:extLst>
+  </p:cSld>
+  <p:clrMapOvr>
+    <a:masterClrMapping/>
+  </p:clrMapOvr>
+</p:sld>
+</file>
+
+<file path=ppt/slides/slide6.xml><?xml version="1.0" encoding="utf-8"?>
+<p:sld xmlns:a="http://schemas.openxmlformats.org/drawingml/2006/main" xmlns:r="http://schemas.openxmlformats.org/officeDocument/2006/relationships" xmlns:p="http://schemas.openxmlformats.org/presentationml/2006/main">
+  <p:cSld>
+    <p:spTree>
+      <p:nvGrpSpPr>
+        <p:cNvPr id="1" name=""/>
+        <p:cNvGrpSpPr/>
+        <p:nvPr/>
+      </p:nvGrpSpPr>
+      <p:grpSpPr>
+        <a:xfrm>
+          <a:off x="0" y="0"/>
+          <a:ext cx="0" cy="0"/>
+          <a:chOff x="0" y="0"/>
+          <a:chExt cx="0" cy="0"/>
+        </a:xfrm>
+      </p:grpSpPr>
+      <p:sp>
+        <p:nvSpPr>
+          <p:cNvPr id="2" name="Title 1"/>
+          <p:cNvSpPr>
+            <a:spLocks noGrp="1"/>
+          </p:cNvSpPr>
+          <p:nvPr>
+            <p:ph type="title"/>
+          </p:nvPr>
+        </p:nvSpPr>
+        <p:spPr/>
+        <p:txBody>
+          <a:bodyPr/>
+          <a:lstStyle/>
+          <a:p>
+            <a:r>
+              <a:rPr lang="en-US" dirty="0" smtClean="0"/>
+              <a:t>Publish a feature</a:t>
+            </a:r>
+            <a:endParaRPr lang="en-US" dirty="0"/>
+          </a:p>
+        </p:txBody>
+      </p:sp>
+      <p:sp>
+        <p:nvSpPr>
+          <p:cNvPr id="3" name="Content Placeholder 2"/>
+          <p:cNvSpPr>
+            <a:spLocks noGrp="1"/>
+          </p:cNvSpPr>
+          <p:nvPr>
+            <p:ph idx="1"/>
+          </p:nvPr>
+        </p:nvSpPr>
+        <p:spPr/>
+        <p:txBody>
+          <a:bodyPr/>
+          <a:lstStyle/>
+          <a:p>
+            <a:r>
+              <a:rPr lang="en-US" dirty="0" smtClean="0"/>
+              <a:t>Push to the public repository.</a:t>
+            </a:r>
+            <a:endParaRPr lang="en-US" dirty="0"/>
+          </a:p>
+        </p:txBody>
+      </p:sp>
+      <p:pic>
+        <p:nvPicPr>
+          <p:cNvPr id="4" name="Picture 3"/>
+          <p:cNvPicPr>
+            <a:picLocks noChangeAspect="1"/>
+          </p:cNvPicPr>
+          <p:nvPr/>
+        </p:nvPicPr>
+        <p:blipFill>
+          <a:blip r:embed="rId2">
+            <a:extLst>
+              <a:ext uri="{28A0092B-C50C-407E-A947-70E740481C1C}">
+                <a14:useLocalDpi xmlns:a14="http://schemas.microsoft.com/office/drawing/2010/main" val="0"/>
+              </a:ext>
+            </a:extLst>
+          </a:blip>
+          <a:stretch>
+            <a:fillRect/>
+          </a:stretch>
+        </p:blipFill>
+        <p:spPr>
+          <a:xfrm>
+            <a:off x="2858814" y="2322183"/>
+            <a:ext cx="5550546" cy="4209995"/>
+          </a:xfrm>
+          <a:prstGeom prst="rect">
+            <a:avLst/>
+          </a:prstGeom>
+        </p:spPr>
+      </p:pic>
+      <p:pic>
+        <p:nvPicPr>
+          <p:cNvPr id="5" name="Picture 4"/>
+          <p:cNvPicPr>
+            <a:picLocks noChangeAspect="1"/>
+          </p:cNvPicPr>
+          <p:nvPr/>
+        </p:nvPicPr>
+        <p:blipFill rotWithShape="1">
+          <a:blip r:embed="rId3">
+            <a:extLst>
+              <a:ext uri="{28A0092B-C50C-407E-A947-70E740481C1C}">
+                <a14:useLocalDpi xmlns:a14="http://schemas.microsoft.com/office/drawing/2010/main" val="0"/>
+              </a:ext>
+            </a:extLst>
+          </a:blip>
+          <a:srcRect r="43342"/>
+          <a:stretch/>
+        </p:blipFill>
+        <p:spPr>
+          <a:xfrm>
+            <a:off x="7561755" y="1478893"/>
+            <a:ext cx="3792045" cy="520700"/>
+          </a:xfrm>
+          <a:prstGeom prst="rect">
+            <a:avLst/>
+          </a:prstGeom>
+        </p:spPr>
+      </p:pic>
+    </p:spTree>
+    <p:extLst>
+      <p:ext uri="{BB962C8B-B14F-4D97-AF65-F5344CB8AC3E}">
+        <p14:creationId xmlns:p14="http://schemas.microsoft.com/office/powerpoint/2010/main" val="2103059989"/>
       </p:ext>
     </p:extLst>
   </p:cSld>
@@ -4180,49 +3829,22 @@
           <a:lstStyle/>
           <a:p>
             <a:r>
-              <a:rPr lang="en-US" dirty="0"/>
-              <a:t>F</a:t>
-            </a:r>
-            <a:r>
               <a:rPr lang="en-US" dirty="0" smtClean="0"/>
-              <a:t>inishes a Feature</a:t>
-            </a:r>
-            <a:endParaRPr lang="en-US" dirty="0"/>
-          </a:p>
-        </p:txBody>
-      </p:sp>
-      <p:sp>
-        <p:nvSpPr>
-          <p:cNvPr id="3" name="Content Placeholder 2"/>
-          <p:cNvSpPr>
-            <a:spLocks noGrp="1"/>
-          </p:cNvSpPr>
-          <p:nvPr>
-            <p:ph idx="1"/>
-          </p:nvPr>
-        </p:nvSpPr>
-        <p:spPr/>
-        <p:txBody>
-          <a:bodyPr/>
-          <a:lstStyle/>
-          <a:p>
-            <a:r>
-              <a:rPr lang="en-US" dirty="0" smtClean="0"/>
-              <a:t>Merge into local develop branch and push into central repo.</a:t>
-            </a:r>
-          </a:p>
-          <a:p>
+              <a:t>Project Maintainer Integrates</a:t>
+            </a:r>
             <a:endParaRPr lang="en-US" dirty="0"/>
           </a:p>
         </p:txBody>
       </p:sp>
       <p:pic>
         <p:nvPicPr>
-          <p:cNvPr id="4" name="Picture 3"/>
+          <p:cNvPr id="4" name="Content Placeholder 3"/>
           <p:cNvPicPr>
-            <a:picLocks noChangeAspect="1"/>
+            <a:picLocks noGrp="1" noChangeAspect="1"/>
           </p:cNvPicPr>
-          <p:nvPr/>
+          <p:nvPr>
+            <p:ph idx="1"/>
+          </p:nvPr>
         </p:nvPicPr>
         <p:blipFill>
           <a:blip r:embed="rId2">
@@ -4238,18 +3860,117 @@
         </p:blipFill>
         <p:spPr>
           <a:xfrm>
-            <a:off x="2749550" y="2957513"/>
-            <a:ext cx="6692900" cy="1358900"/>
+            <a:off x="7478548" y="1690688"/>
+            <a:ext cx="4276460" cy="3383538"/>
+          </a:xfrm>
+        </p:spPr>
+      </p:pic>
+      <p:pic>
+        <p:nvPicPr>
+          <p:cNvPr id="5" name="Content Placeholder 3"/>
+          <p:cNvPicPr>
+            <a:picLocks noChangeAspect="1"/>
+          </p:cNvPicPr>
+          <p:nvPr/>
+        </p:nvPicPr>
+        <p:blipFill>
+          <a:blip r:embed="rId3">
+            <a:extLst>
+              <a:ext uri="{28A0092B-C50C-407E-A947-70E740481C1C}">
+                <a14:useLocalDpi xmlns:a14="http://schemas.microsoft.com/office/drawing/2010/main" val="0"/>
+              </a:ext>
+            </a:extLst>
+          </a:blip>
+          <a:stretch>
+            <a:fillRect/>
+          </a:stretch>
+        </p:blipFill>
+        <p:spPr>
+          <a:xfrm>
+            <a:off x="811924" y="2908726"/>
+            <a:ext cx="6692900" cy="1155700"/>
           </a:xfrm>
           <a:prstGeom prst="rect">
             <a:avLst/>
           </a:prstGeom>
         </p:spPr>
       </p:pic>
+      <p:pic>
+        <p:nvPicPr>
+          <p:cNvPr id="6" name="Picture 5"/>
+          <p:cNvPicPr>
+            <a:picLocks noChangeAspect="1"/>
+          </p:cNvPicPr>
+          <p:nvPr/>
+        </p:nvPicPr>
+        <p:blipFill>
+          <a:blip r:embed="rId4">
+            <a:extLst>
+              <a:ext uri="{28A0092B-C50C-407E-A947-70E740481C1C}">
+                <a14:useLocalDpi xmlns:a14="http://schemas.microsoft.com/office/drawing/2010/main" val="0"/>
+              </a:ext>
+            </a:extLst>
+          </a:blip>
+          <a:stretch>
+            <a:fillRect/>
+          </a:stretch>
+        </p:blipFill>
+        <p:spPr>
+          <a:xfrm>
+            <a:off x="772948" y="4727207"/>
+            <a:ext cx="6705600" cy="508000"/>
+          </a:xfrm>
+          <a:prstGeom prst="rect">
+            <a:avLst/>
+          </a:prstGeom>
+        </p:spPr>
+      </p:pic>
+      <p:sp>
+        <p:nvSpPr>
+          <p:cNvPr id="7" name="TextBox 6"/>
+          <p:cNvSpPr txBox="1"/>
+          <p:nvPr/>
+        </p:nvSpPr>
+        <p:spPr>
+          <a:xfrm>
+            <a:off x="2228193" y="2168803"/>
+            <a:ext cx="3867807" cy="369332"/>
+          </a:xfrm>
+          <a:prstGeom prst="rect">
+            <a:avLst/>
+          </a:prstGeom>
+          <a:noFill/>
+        </p:spPr>
+        <p:txBody>
+          <a:bodyPr wrap="square" rtlCol="0">
+            <a:spAutoFit/>
+          </a:bodyPr>
+          <a:lstStyle/>
+          <a:p>
+            <a:pPr marL="285750" indent="-285750">
+              <a:buFont typeface="Arial" charset="0"/>
+              <a:buChar char="•"/>
+            </a:pPr>
+            <a:r>
+              <a:rPr lang="en-US" dirty="0" smtClean="0"/>
+              <a:t>Fetch </a:t>
+            </a:r>
+            <a:r>
+              <a:rPr lang="en-US" smtClean="0"/>
+              <a:t>and integrate </a:t>
+            </a:r>
+            <a:r>
+              <a:rPr lang="en-US" dirty="0" smtClean="0"/>
+              <a:t>to master repo</a:t>
+            </a:r>
+            <a:endParaRPr lang="en-US" dirty="0"/>
+          </a:p>
+        </p:txBody>
+      </p:sp>
     </p:spTree>
     <p:extLst>
       <p:ext uri="{BB962C8B-B14F-4D97-AF65-F5344CB8AC3E}">
-        <p14:creationId xmlns:p14="http://schemas.microsoft.com/office/powerpoint/2010/main" val="858048656"/>
+        <p14:creationId xmlns:p14="http://schemas.microsoft.com/office/powerpoint/2010/main" val="813880724"/>
       </p:ext>
     </p:extLst>
   </p:cSld>
@@ -4292,12 +4013,8 @@
           <a:lstStyle/>
           <a:p>
             <a:r>
-              <a:rPr lang="en-US" dirty="0"/>
-              <a:t>Release </a:t>
-            </a:r>
-            <a:r>
               <a:rPr lang="en-US" dirty="0" smtClean="0"/>
-              <a:t>Branches</a:t>
+              <a:t>Developers synchronize with official repo</a:t>
             </a:r>
             <a:endParaRPr lang="en-US" dirty="0"/>
           </a:p>
@@ -4320,42 +4037,9 @@
           <a:p>
             <a:r>
               <a:rPr lang="en-US" dirty="0" smtClean="0"/>
-              <a:t>Fork a release branch off of develop.</a:t>
-            </a:r>
-          </a:p>
-          <a:p>
-            <a:pPr lvl="1"/>
-            <a:r>
-              <a:rPr lang="en-US" dirty="0" smtClean="0"/>
-              <a:t>Check for bugs and </a:t>
-            </a:r>
-            <a:r>
-              <a:rPr lang="en-US" dirty="0"/>
-              <a:t>other release-oriented </a:t>
-            </a:r>
-            <a:r>
-              <a:rPr lang="en-US" dirty="0" smtClean="0"/>
-              <a:t>tasks.</a:t>
-            </a:r>
-          </a:p>
-          <a:p>
-            <a:pPr lvl="1"/>
-            <a:r>
-              <a:rPr lang="en-US" dirty="0"/>
-              <a:t>Once it's </a:t>
-            </a:r>
-            <a:r>
-              <a:rPr lang="en-US" dirty="0" smtClean="0"/>
-              <a:t>ready </a:t>
-            </a:r>
-            <a:r>
-              <a:rPr lang="en-US" dirty="0"/>
-              <a:t>merged </a:t>
-            </a:r>
-            <a:r>
-              <a:rPr lang="en-US" dirty="0" smtClean="0"/>
-              <a:t>into master.</a:t>
-            </a:r>
+              <a:t>Synchronize to changes with main codebase master</a:t>
+            </a:r>
+            <a:endParaRPr lang="en-US" dirty="0"/>
           </a:p>
         </p:txBody>
       </p:sp>
@@ -4381,132 +4065,7 @@
         </p:blipFill>
         <p:spPr>
           <a:xfrm>
-            <a:off x="6096000" y="2701849"/>
-            <a:ext cx="5429587" cy="3475114"/>
-          </a:xfrm>
-          <a:prstGeom prst="rect">
-            <a:avLst/>
-          </a:prstGeom>
-        </p:spPr>
-      </p:pic>
-    </p:spTree>
-    <p:extLst>
-      <p:ext uri="{BB962C8B-B14F-4D97-AF65-F5344CB8AC3E}">
-        <p14:creationId xmlns:p14="http://schemas.microsoft.com/office/powerpoint/2010/main" val="130875697"/>
-      </p:ext>
-    </p:extLst>
-  </p:cSld>
-  <p:clrMapOvr>
-    <a:masterClrMapping/>
-  </p:clrMapOvr>
-</p:sld>
-</file>
-
-<file path=ppt/slides/slide9.xml><?xml version="1.0" encoding="utf-8"?>
-<p:sld xmlns:a="http://schemas.openxmlformats.org/drawingml/2006/main" xmlns:r="http://schemas.openxmlformats.org/officeDocument/2006/relationships" xmlns:p="http://schemas.openxmlformats.org/presentationml/2006/main">
-  <p:cSld>
-    <p:spTree>
-      <p:nvGrpSpPr>
-        <p:cNvPr id="1" name=""/>
-        <p:cNvGrpSpPr/>
-        <p:nvPr/>
-      </p:nvGrpSpPr>
-      <p:grpSpPr>
-        <a:xfrm>
-          <a:off x="0" y="0"/>
-          <a:ext cx="0" cy="0"/>
-          <a:chOff x="0" y="0"/>
-          <a:chExt cx="0" cy="0"/>
-        </a:xfrm>
-      </p:grpSpPr>
-      <p:sp>
-        <p:nvSpPr>
-          <p:cNvPr id="2" name="Title 1"/>
-          <p:cNvSpPr>
-            <a:spLocks noGrp="1"/>
-          </p:cNvSpPr>
-          <p:nvPr>
-            <p:ph type="title"/>
-          </p:nvPr>
-        </p:nvSpPr>
-        <p:spPr/>
-        <p:txBody>
-          <a:bodyPr/>
-          <a:lstStyle/>
-          <a:p>
-            <a:r>
-              <a:rPr lang="en-US" dirty="0" smtClean="0"/>
-              <a:t>Prepare a Release </a:t>
-            </a:r>
-            <a:endParaRPr lang="en-US" dirty="0"/>
-          </a:p>
-        </p:txBody>
-      </p:sp>
-      <p:sp>
-        <p:nvSpPr>
-          <p:cNvPr id="3" name="Content Placeholder 2"/>
-          <p:cNvSpPr>
-            <a:spLocks noGrp="1"/>
-          </p:cNvSpPr>
-          <p:nvPr>
-            <p:ph idx="1"/>
-          </p:nvPr>
-        </p:nvSpPr>
-        <p:spPr>
-          <a:xfrm>
-            <a:off x="838200" y="1854200"/>
-            <a:ext cx="10515600" cy="4351338"/>
-          </a:xfrm>
-        </p:spPr>
-        <p:txBody>
-          <a:bodyPr/>
-          <a:lstStyle/>
-          <a:p>
-            <a:r>
-              <a:rPr lang="en-US" dirty="0" smtClean="0"/>
-              <a:t>Create new branch from develop branch.</a:t>
-            </a:r>
-          </a:p>
-          <a:p>
-            <a:endParaRPr lang="en-US" dirty="0"/>
-          </a:p>
-          <a:p>
-            <a:endParaRPr lang="en-US" dirty="0" smtClean="0"/>
-          </a:p>
-          <a:p>
-            <a:r>
-              <a:rPr lang="en-US" dirty="0" smtClean="0"/>
-              <a:t>When the release branch is ready to be merge.</a:t>
-            </a:r>
-          </a:p>
-          <a:p>
-            <a:endParaRPr lang="en-US" dirty="0"/>
-          </a:p>
-        </p:txBody>
-      </p:sp>
-      <p:pic>
-        <p:nvPicPr>
-          <p:cNvPr id="4" name="Picture 3"/>
-          <p:cNvPicPr>
-            <a:picLocks noChangeAspect="1"/>
-          </p:cNvPicPr>
-          <p:nvPr/>
-        </p:nvPicPr>
-        <p:blipFill>
-          <a:blip r:embed="rId2">
-            <a:extLst>
-              <a:ext uri="{28A0092B-C50C-407E-A947-70E740481C1C}">
-                <a14:useLocalDpi xmlns:a14="http://schemas.microsoft.com/office/drawing/2010/main" val="0"/>
-              </a:ext>
-            </a:extLst>
-          </a:blip>
-          <a:stretch>
-            <a:fillRect/>
-          </a:stretch>
-        </p:blipFill>
-        <p:spPr>
-          <a:xfrm>
-            <a:off x="2743200" y="2590800"/>
+            <a:off x="2743200" y="2437086"/>
             <a:ext cx="6705600" cy="520700"/>
           </a:xfrm>
           <a:prstGeom prst="rect">
@@ -4536,8 +4095,8 @@
         </p:blipFill>
         <p:spPr>
           <a:xfrm>
-            <a:off x="2743200" y="4029869"/>
-            <a:ext cx="6718300" cy="1803400"/>
+            <a:off x="3673923" y="2957786"/>
+            <a:ext cx="4844154" cy="3717606"/>
           </a:xfrm>
           <a:prstGeom prst="rect">
             <a:avLst/>
@@ -4547,7 +4106,7 @@
     </p:spTree>
     <p:extLst>
       <p:ext uri="{BB962C8B-B14F-4D97-AF65-F5344CB8AC3E}">
-        <p14:creationId xmlns:p14="http://schemas.microsoft.com/office/powerpoint/2010/main" val="1627328680"/>
+        <p14:creationId xmlns:p14="http://schemas.microsoft.com/office/powerpoint/2010/main" val="602995889"/>
       </p:ext>
     </p:extLst>
   </p:cSld>

</xml_diff>